<commit_message>
Apresentacao Final - Sprint1
</commit_message>
<xml_diff>
--- a/Apresentacao_Sprint1.pptx
+++ b/Apresentacao_Sprint1.pptx
@@ -16,7 +16,7 @@
     <p:sldId id="260" r:id="rId4"/>
     <p:sldId id="262" r:id="rId5"/>
     <p:sldId id="285" r:id="rId6"/>
-    <p:sldId id="291" r:id="rId7"/>
+    <p:sldId id="292" r:id="rId7"/>
     <p:sldId id="286" r:id="rId8"/>
     <p:sldId id="287" r:id="rId9"/>
     <p:sldId id="288" r:id="rId10"/>
@@ -12924,7 +12924,7 @@
           <p:cNvPr id="2" name="Espaço Reservado para Número de Slide 1">
             <a:extLst>
               <a:ext uri="{FF2B5EF4-FFF2-40B4-BE49-F238E27FC236}">
-                <a16:creationId xmlns:a16="http://schemas.microsoft.com/office/drawing/2014/main" id="{B6629EEC-A550-468B-85F7-748207DD51DD}"/>
+                <a16:creationId xmlns:a16="http://schemas.microsoft.com/office/drawing/2014/main" id="{5A52E29B-0C66-4D18-BF7C-8C3D1A5974D1}"/>
               </a:ext>
             </a:extLst>
           </p:cNvPr>
@@ -12962,7 +12962,7 @@
           <p:cNvPr id="3" name="Imagem 2">
             <a:extLst>
               <a:ext uri="{FF2B5EF4-FFF2-40B4-BE49-F238E27FC236}">
-                <a16:creationId xmlns:a16="http://schemas.microsoft.com/office/drawing/2014/main" id="{3971024D-A432-4F00-9888-F359B83EDE56}"/>
+                <a16:creationId xmlns:a16="http://schemas.microsoft.com/office/drawing/2014/main" id="{766CB865-9107-4044-86F2-8979023B0E3A}"/>
               </a:ext>
             </a:extLst>
           </p:cNvPr>
@@ -12979,8 +12979,8 @@
         </p:blipFill>
         <p:spPr>
           <a:xfrm>
-            <a:off x="781378" y="0"/>
-            <a:ext cx="8362622" cy="4680020"/>
+            <a:off x="730538" y="0"/>
+            <a:ext cx="8413462" cy="4730263"/>
           </a:xfrm>
           <a:prstGeom prst="rect">
             <a:avLst/>
@@ -12992,7 +12992,7 @@
           <p:cNvPr id="4" name="Google Shape;479;p15">
             <a:extLst>
               <a:ext uri="{FF2B5EF4-FFF2-40B4-BE49-F238E27FC236}">
-                <a16:creationId xmlns:a16="http://schemas.microsoft.com/office/drawing/2014/main" id="{867EB730-5B36-4852-ABF1-1A124E6AD333}"/>
+                <a16:creationId xmlns:a16="http://schemas.microsoft.com/office/drawing/2014/main" id="{334EB064-62F5-408D-B6D2-591CCB276789}"/>
               </a:ext>
             </a:extLst>
           </p:cNvPr>
@@ -13003,7 +13003,7 @@
         </p:nvSpPr>
         <p:spPr>
           <a:xfrm>
-            <a:off x="0" y="921705"/>
+            <a:off x="0" y="992044"/>
             <a:ext cx="2200589" cy="866274"/>
           </a:xfrm>
           <a:prstGeom prst="rect">
@@ -13288,7 +13288,7 @@
     </p:spTree>
     <p:extLst>
       <p:ext uri="{BB962C8B-B14F-4D97-AF65-F5344CB8AC3E}">
-        <p14:creationId xmlns:p14="http://schemas.microsoft.com/office/powerpoint/2010/main" val="1941525095"/>
+        <p14:creationId xmlns:p14="http://schemas.microsoft.com/office/powerpoint/2010/main" val="2723267537"/>
       </p:ext>
     </p:extLst>
   </p:cSld>

</xml_diff>